<commit_message>
Updated the Pickup and delivery Menu
Updated the powerpoint, pick up and delivery menu version 1 and 2 and have created a 3rd version
</commit_message>
<xml_diff>
--- a/022_91893+_+91897+Documentation.pptx
+++ b/022_91893+_+91897+Documentation.pptx
@@ -5,7 +5,7 @@
     <p:sldMasterId id="2147483659" r:id="rId1"/>
   </p:sldMasterIdLst>
   <p:notesMasterIdLst>
-    <p:notesMasterId r:id="rId10"/>
+    <p:notesMasterId r:id="rId14"/>
   </p:notesMasterIdLst>
   <p:sldIdLst>
     <p:sldId id="256" r:id="rId2"/>
@@ -14,8 +14,12 @@
     <p:sldId id="259" r:id="rId5"/>
     <p:sldId id="260" r:id="rId6"/>
     <p:sldId id="263" r:id="rId7"/>
-    <p:sldId id="261" r:id="rId8"/>
-    <p:sldId id="262" r:id="rId9"/>
+    <p:sldId id="264" r:id="rId8"/>
+    <p:sldId id="265" r:id="rId9"/>
+    <p:sldId id="266" r:id="rId10"/>
+    <p:sldId id="267" r:id="rId11"/>
+    <p:sldId id="261" r:id="rId12"/>
+    <p:sldId id="262" r:id="rId13"/>
   </p:sldIdLst>
   <p:sldSz cx="9144000" cy="5143500" type="screen16x9"/>
   <p:notesSz cx="6858000" cy="9144000"/>
@@ -267,17 +271,25 @@
 </p:presentation>
 </file>
 
+<file path=ppt/revisionInfo.xml><?xml version="1.0" encoding="utf-8"?>
+<p1510:revInfo xmlns:a="http://schemas.openxmlformats.org/drawingml/2006/main" xmlns:r="http://schemas.openxmlformats.org/officeDocument/2006/relationships" xmlns:p1510="http://schemas.microsoft.com/office/powerpoint/2015/10/main">
+  <p1510:revLst>
+    <p1510:client id="{FAACEEAB-46CB-4F54-BC5F-BC4B34800FB7}" v="12" dt="2022-02-20T21:39:32.377"/>
+  </p1510:revLst>
+</p1510:revInfo>
+</file>
+
 <file path=ppt/changesInfos/changesInfo1.xml><?xml version="1.0" encoding="utf-8"?>
 <pc:chgInfo xmlns:a="http://schemas.openxmlformats.org/drawingml/2006/main" xmlns:r="http://schemas.openxmlformats.org/officeDocument/2006/relationships" xmlns:ac="http://schemas.microsoft.com/office/drawing/2013/main/command" xmlns:pc="http://schemas.microsoft.com/office/powerpoint/2013/main/command">
   <pc:docChgLst>
     <pc:chgData name="Daniel Pereira" userId="9d9a6c6d5611e777" providerId="LiveId" clId="{FAACEEAB-46CB-4F54-BC5F-BC4B34800FB7}"/>
-    <pc:docChg chg="undo custSel addSld modSld">
-      <pc:chgData name="Daniel Pereira" userId="9d9a6c6d5611e777" providerId="LiveId" clId="{FAACEEAB-46CB-4F54-BC5F-BC4B34800FB7}" dt="2022-02-14T00:20:25.925" v="345" actId="20577"/>
+    <pc:docChg chg="undo custSel addSld delSld modSld sldOrd">
+      <pc:chgData name="Daniel Pereira" userId="9d9a6c6d5611e777" providerId="LiveId" clId="{FAACEEAB-46CB-4F54-BC5F-BC4B34800FB7}" dt="2022-02-20T21:39:39.921" v="660" actId="478"/>
       <pc:docMkLst>
         <pc:docMk/>
       </pc:docMkLst>
-      <pc:sldChg chg="addSp delSp modSp mod">
-        <pc:chgData name="Daniel Pereira" userId="9d9a6c6d5611e777" providerId="LiveId" clId="{FAACEEAB-46CB-4F54-BC5F-BC4B34800FB7}" dt="2022-02-14T00:20:25.925" v="345" actId="20577"/>
+      <pc:sldChg chg="addSp delSp modSp mod setBg">
+        <pc:chgData name="Daniel Pereira" userId="9d9a6c6d5611e777" providerId="LiveId" clId="{FAACEEAB-46CB-4F54-BC5F-BC4B34800FB7}" dt="2022-02-18T01:52:25.910" v="353"/>
         <pc:sldMkLst>
           <pc:docMk/>
           <pc:sldMk cId="0" sldId="259"/>
@@ -406,6 +418,225 @@
             <pc:docMk/>
             <pc:sldMk cId="1059849626" sldId="263"/>
             <ac:picMk id="5" creationId="{E8750712-8FF6-4E63-901E-046A7A15C35D}"/>
+          </ac:picMkLst>
+        </pc:picChg>
+      </pc:sldChg>
+      <pc:sldChg chg="add del setBg">
+        <pc:chgData name="Daniel Pereira" userId="9d9a6c6d5611e777" providerId="LiveId" clId="{FAACEEAB-46CB-4F54-BC5F-BC4B34800FB7}" dt="2022-02-18T01:50:44.015" v="347"/>
+        <pc:sldMkLst>
+          <pc:docMk/>
+          <pc:sldMk cId="1177779669" sldId="264"/>
+        </pc:sldMkLst>
+      </pc:sldChg>
+      <pc:sldChg chg="addSp delSp modSp add mod ord setBg">
+        <pc:chgData name="Daniel Pereira" userId="9d9a6c6d5611e777" providerId="LiveId" clId="{FAACEEAB-46CB-4F54-BC5F-BC4B34800FB7}" dt="2022-02-18T02:02:30.889" v="410" actId="14100"/>
+        <pc:sldMkLst>
+          <pc:docMk/>
+          <pc:sldMk cId="2184574201" sldId="264"/>
+        </pc:sldMkLst>
+        <pc:spChg chg="mod">
+          <ac:chgData name="Daniel Pereira" userId="9d9a6c6d5611e777" providerId="LiveId" clId="{FAACEEAB-46CB-4F54-BC5F-BC4B34800FB7}" dt="2022-02-18T01:55:37.509" v="405" actId="20577"/>
+          <ac:spMkLst>
+            <pc:docMk/>
+            <pc:sldMk cId="2184574201" sldId="264"/>
+            <ac:spMk id="73" creationId="{00000000-0000-0000-0000-000000000000}"/>
+          </ac:spMkLst>
+        </pc:spChg>
+        <pc:picChg chg="add mod">
+          <ac:chgData name="Daniel Pereira" userId="9d9a6c6d5611e777" providerId="LiveId" clId="{FAACEEAB-46CB-4F54-BC5F-BC4B34800FB7}" dt="2022-02-18T02:02:30.889" v="410" actId="14100"/>
+          <ac:picMkLst>
+            <pc:docMk/>
+            <pc:sldMk cId="2184574201" sldId="264"/>
+            <ac:picMk id="3" creationId="{197D0697-87BD-40C4-BD69-675F260A2009}"/>
+          </ac:picMkLst>
+        </pc:picChg>
+        <pc:picChg chg="del">
+          <ac:chgData name="Daniel Pereira" userId="9d9a6c6d5611e777" providerId="LiveId" clId="{FAACEEAB-46CB-4F54-BC5F-BC4B34800FB7}" dt="2022-02-18T01:55:23.735" v="376" actId="478"/>
+          <ac:picMkLst>
+            <pc:docMk/>
+            <pc:sldMk cId="2184574201" sldId="264"/>
+            <ac:picMk id="5" creationId="{FF020B5E-747E-42D1-8E22-C582E558722A}"/>
+          </ac:picMkLst>
+        </pc:picChg>
+        <pc:picChg chg="del">
+          <ac:chgData name="Daniel Pereira" userId="9d9a6c6d5611e777" providerId="LiveId" clId="{FAACEEAB-46CB-4F54-BC5F-BC4B34800FB7}" dt="2022-02-18T01:55:25.499" v="377" actId="478"/>
+          <ac:picMkLst>
+            <pc:docMk/>
+            <pc:sldMk cId="2184574201" sldId="264"/>
+            <ac:picMk id="7" creationId="{9D3FFD21-52C3-4EEE-B0D4-688402A048AF}"/>
+          </ac:picMkLst>
+        </pc:picChg>
+      </pc:sldChg>
+      <pc:sldChg chg="addSp delSp modSp add mod">
+        <pc:chgData name="Daniel Pereira" userId="9d9a6c6d5611e777" providerId="LiveId" clId="{FAACEEAB-46CB-4F54-BC5F-BC4B34800FB7}" dt="2022-02-20T21:33:00.769" v="550" actId="1076"/>
+        <pc:sldMkLst>
+          <pc:docMk/>
+          <pc:sldMk cId="1708805901" sldId="265"/>
+        </pc:sldMkLst>
+        <pc:spChg chg="mod">
+          <ac:chgData name="Daniel Pereira" userId="9d9a6c6d5611e777" providerId="LiveId" clId="{FAACEEAB-46CB-4F54-BC5F-BC4B34800FB7}" dt="2022-02-18T01:55:07.540" v="361" actId="20577"/>
+          <ac:spMkLst>
+            <pc:docMk/>
+            <pc:sldMk cId="1708805901" sldId="265"/>
+            <ac:spMk id="78" creationId="{00000000-0000-0000-0000-000000000000}"/>
+          </ac:spMkLst>
+        </pc:spChg>
+        <pc:graphicFrameChg chg="modGraphic">
+          <ac:chgData name="Daniel Pereira" userId="9d9a6c6d5611e777" providerId="LiveId" clId="{FAACEEAB-46CB-4F54-BC5F-BC4B34800FB7}" dt="2022-02-20T21:30:23.836" v="544" actId="20577"/>
+          <ac:graphicFrameMkLst>
+            <pc:docMk/>
+            <pc:sldMk cId="1708805901" sldId="265"/>
+            <ac:graphicFrameMk id="79" creationId="{00000000-0000-0000-0000-000000000000}"/>
+          </ac:graphicFrameMkLst>
+        </pc:graphicFrameChg>
+        <pc:picChg chg="add mod">
+          <ac:chgData name="Daniel Pereira" userId="9d9a6c6d5611e777" providerId="LiveId" clId="{FAACEEAB-46CB-4F54-BC5F-BC4B34800FB7}" dt="2022-02-20T21:26:58.744" v="416" actId="14100"/>
+          <ac:picMkLst>
+            <pc:docMk/>
+            <pc:sldMk cId="1708805901" sldId="265"/>
+            <ac:picMk id="3" creationId="{B8BF7FB4-B9AF-4E66-B789-79D79B11BBB0}"/>
+          </ac:picMkLst>
+        </pc:picChg>
+        <pc:picChg chg="del">
+          <ac:chgData name="Daniel Pereira" userId="9d9a6c6d5611e777" providerId="LiveId" clId="{FAACEEAB-46CB-4F54-BC5F-BC4B34800FB7}" dt="2022-02-18T01:55:09.462" v="362" actId="478"/>
+          <ac:picMkLst>
+            <pc:docMk/>
+            <pc:sldMk cId="1708805901" sldId="265"/>
+            <ac:picMk id="3" creationId="{D2E9902A-758D-403F-AA4D-504512D40CD0}"/>
+          </ac:picMkLst>
+        </pc:picChg>
+        <pc:picChg chg="add mod">
+          <ac:chgData name="Daniel Pereira" userId="9d9a6c6d5611e777" providerId="LiveId" clId="{FAACEEAB-46CB-4F54-BC5F-BC4B34800FB7}" dt="2022-02-20T21:33:00.769" v="550" actId="1076"/>
+          <ac:picMkLst>
+            <pc:docMk/>
+            <pc:sldMk cId="1708805901" sldId="265"/>
+            <ac:picMk id="5" creationId="{608389D4-B7E5-4903-A648-96A3DC606C0C}"/>
+          </ac:picMkLst>
+        </pc:picChg>
+        <pc:picChg chg="del">
+          <ac:chgData name="Daniel Pereira" userId="9d9a6c6d5611e777" providerId="LiveId" clId="{FAACEEAB-46CB-4F54-BC5F-BC4B34800FB7}" dt="2022-02-18T01:55:11.143" v="363" actId="478"/>
+          <ac:picMkLst>
+            <pc:docMk/>
+            <pc:sldMk cId="1708805901" sldId="265"/>
+            <ac:picMk id="5" creationId="{9F17454D-D691-436E-93D5-1E0B6F752A09}"/>
+          </ac:picMkLst>
+        </pc:picChg>
+        <pc:picChg chg="add mod">
+          <ac:chgData name="Daniel Pereira" userId="9d9a6c6d5611e777" providerId="LiveId" clId="{FAACEEAB-46CB-4F54-BC5F-BC4B34800FB7}" dt="2022-02-20T21:32:56.059" v="549" actId="14100"/>
+          <ac:picMkLst>
+            <pc:docMk/>
+            <pc:sldMk cId="1708805901" sldId="265"/>
+            <ac:picMk id="7" creationId="{777C52D0-8C4F-45F1-A447-F1FF11B77E89}"/>
+          </ac:picMkLst>
+        </pc:picChg>
+      </pc:sldChg>
+      <pc:sldChg chg="addSp delSp modSp add mod">
+        <pc:chgData name="Daniel Pereira" userId="9d9a6c6d5611e777" providerId="LiveId" clId="{FAACEEAB-46CB-4F54-BC5F-BC4B34800FB7}" dt="2022-02-20T21:39:13.591" v="654" actId="1076"/>
+        <pc:sldMkLst>
+          <pc:docMk/>
+          <pc:sldMk cId="545315332" sldId="266"/>
+        </pc:sldMkLst>
+        <pc:spChg chg="mod">
+          <ac:chgData name="Daniel Pereira" userId="9d9a6c6d5611e777" providerId="LiveId" clId="{FAACEEAB-46CB-4F54-BC5F-BC4B34800FB7}" dt="2022-02-20T21:33:08.349" v="553" actId="20577"/>
+          <ac:spMkLst>
+            <pc:docMk/>
+            <pc:sldMk cId="545315332" sldId="266"/>
+            <ac:spMk id="78" creationId="{00000000-0000-0000-0000-000000000000}"/>
+          </ac:spMkLst>
+        </pc:spChg>
+        <pc:graphicFrameChg chg="mod modGraphic">
+          <ac:chgData name="Daniel Pereira" userId="9d9a6c6d5611e777" providerId="LiveId" clId="{FAACEEAB-46CB-4F54-BC5F-BC4B34800FB7}" dt="2022-02-20T21:37:17.322" v="641" actId="1076"/>
+          <ac:graphicFrameMkLst>
+            <pc:docMk/>
+            <pc:sldMk cId="545315332" sldId="266"/>
+            <ac:graphicFrameMk id="79" creationId="{00000000-0000-0000-0000-000000000000}"/>
+          </ac:graphicFrameMkLst>
+        </pc:graphicFrameChg>
+        <pc:picChg chg="del">
+          <ac:chgData name="Daniel Pereira" userId="9d9a6c6d5611e777" providerId="LiveId" clId="{FAACEEAB-46CB-4F54-BC5F-BC4B34800FB7}" dt="2022-02-20T21:33:10.345" v="554" actId="478"/>
+          <ac:picMkLst>
+            <pc:docMk/>
+            <pc:sldMk cId="545315332" sldId="266"/>
+            <ac:picMk id="3" creationId="{B8BF7FB4-B9AF-4E66-B789-79D79B11BBB0}"/>
+          </ac:picMkLst>
+        </pc:picChg>
+        <pc:picChg chg="add mod">
+          <ac:chgData name="Daniel Pereira" userId="9d9a6c6d5611e777" providerId="LiveId" clId="{FAACEEAB-46CB-4F54-BC5F-BC4B34800FB7}" dt="2022-02-20T21:36:45.218" v="560" actId="14100"/>
+          <ac:picMkLst>
+            <pc:docMk/>
+            <pc:sldMk cId="545315332" sldId="266"/>
+            <ac:picMk id="4" creationId="{3832E362-3159-442B-A847-06D8EF6B7A6A}"/>
+          </ac:picMkLst>
+        </pc:picChg>
+        <pc:picChg chg="del">
+          <ac:chgData name="Daniel Pereira" userId="9d9a6c6d5611e777" providerId="LiveId" clId="{FAACEEAB-46CB-4F54-BC5F-BC4B34800FB7}" dt="2022-02-20T21:33:12.012" v="555" actId="478"/>
+          <ac:picMkLst>
+            <pc:docMk/>
+            <pc:sldMk cId="545315332" sldId="266"/>
+            <ac:picMk id="5" creationId="{608389D4-B7E5-4903-A648-96A3DC606C0C}"/>
+          </ac:picMkLst>
+        </pc:picChg>
+        <pc:picChg chg="del">
+          <ac:chgData name="Daniel Pereira" userId="9d9a6c6d5611e777" providerId="LiveId" clId="{FAACEEAB-46CB-4F54-BC5F-BC4B34800FB7}" dt="2022-02-20T21:33:13.839" v="556" actId="478"/>
+          <ac:picMkLst>
+            <pc:docMk/>
+            <pc:sldMk cId="545315332" sldId="266"/>
+            <ac:picMk id="7" creationId="{777C52D0-8C4F-45F1-A447-F1FF11B77E89}"/>
+          </ac:picMkLst>
+        </pc:picChg>
+        <pc:picChg chg="add mod">
+          <ac:chgData name="Daniel Pereira" userId="9d9a6c6d5611e777" providerId="LiveId" clId="{FAACEEAB-46CB-4F54-BC5F-BC4B34800FB7}" dt="2022-02-20T21:39:08.685" v="653" actId="1076"/>
+          <ac:picMkLst>
+            <pc:docMk/>
+            <pc:sldMk cId="545315332" sldId="266"/>
+            <ac:picMk id="8" creationId="{057C1079-588F-4790-9229-59FB718FC3F7}"/>
+          </ac:picMkLst>
+        </pc:picChg>
+        <pc:picChg chg="add mod">
+          <ac:chgData name="Daniel Pereira" userId="9d9a6c6d5611e777" providerId="LiveId" clId="{FAACEEAB-46CB-4F54-BC5F-BC4B34800FB7}" dt="2022-02-20T21:39:13.591" v="654" actId="1076"/>
+          <ac:picMkLst>
+            <pc:docMk/>
+            <pc:sldMk cId="545315332" sldId="266"/>
+            <ac:picMk id="10" creationId="{9940AE9B-D2AE-411F-8657-86D21E039646}"/>
+          </ac:picMkLst>
+        </pc:picChg>
+      </pc:sldChg>
+      <pc:sldChg chg="delSp modSp add mod">
+        <pc:chgData name="Daniel Pereira" userId="9d9a6c6d5611e777" providerId="LiveId" clId="{FAACEEAB-46CB-4F54-BC5F-BC4B34800FB7}" dt="2022-02-20T21:39:39.921" v="660" actId="478"/>
+        <pc:sldMkLst>
+          <pc:docMk/>
+          <pc:sldMk cId="261580919" sldId="267"/>
+        </pc:sldMkLst>
+        <pc:spChg chg="mod">
+          <ac:chgData name="Daniel Pereira" userId="9d9a6c6d5611e777" providerId="LiveId" clId="{FAACEEAB-46CB-4F54-BC5F-BC4B34800FB7}" dt="2022-02-20T21:39:34.959" v="657" actId="20577"/>
+          <ac:spMkLst>
+            <pc:docMk/>
+            <pc:sldMk cId="261580919" sldId="267"/>
+            <ac:spMk id="78" creationId="{00000000-0000-0000-0000-000000000000}"/>
+          </ac:spMkLst>
+        </pc:spChg>
+        <pc:picChg chg="del">
+          <ac:chgData name="Daniel Pereira" userId="9d9a6c6d5611e777" providerId="LiveId" clId="{FAACEEAB-46CB-4F54-BC5F-BC4B34800FB7}" dt="2022-02-20T21:39:36.672" v="658" actId="478"/>
+          <ac:picMkLst>
+            <pc:docMk/>
+            <pc:sldMk cId="261580919" sldId="267"/>
+            <ac:picMk id="4" creationId="{3832E362-3159-442B-A847-06D8EF6B7A6A}"/>
+          </ac:picMkLst>
+        </pc:picChg>
+        <pc:picChg chg="del">
+          <ac:chgData name="Daniel Pereira" userId="9d9a6c6d5611e777" providerId="LiveId" clId="{FAACEEAB-46CB-4F54-BC5F-BC4B34800FB7}" dt="2022-02-20T21:39:38.280" v="659" actId="478"/>
+          <ac:picMkLst>
+            <pc:docMk/>
+            <pc:sldMk cId="261580919" sldId="267"/>
+            <ac:picMk id="8" creationId="{057C1079-588F-4790-9229-59FB718FC3F7}"/>
+          </ac:picMkLst>
+        </pc:picChg>
+        <pc:picChg chg="del">
+          <ac:chgData name="Daniel Pereira" userId="9d9a6c6d5611e777" providerId="LiveId" clId="{FAACEEAB-46CB-4F54-BC5F-BC4B34800FB7}" dt="2022-02-20T21:39:39.921" v="660" actId="478"/>
+          <ac:picMkLst>
+            <pc:docMk/>
+            <pc:sldMk cId="261580919" sldId="267"/>
+            <ac:picMk id="10" creationId="{9940AE9B-D2AE-411F-8657-86D21E039646}"/>
           </ac:picMkLst>
         </pc:picChg>
       </pc:sldChg>
@@ -998,6 +1229,348 @@
 </p:notes>
 </file>
 
+<file path=ppt/notesSlides/notesSlide10.xml><?xml version="1.0" encoding="utf-8"?>
+<p:notes xmlns:a="http://schemas.openxmlformats.org/drawingml/2006/main" xmlns:r="http://schemas.openxmlformats.org/officeDocument/2006/relationships" xmlns:p="http://schemas.openxmlformats.org/presentationml/2006/main" showMasterSp="0" showMasterPhAnim="0">
+  <p:cSld>
+    <p:spTree>
+      <p:nvGrpSpPr>
+        <p:cNvPr id="1" name="Shape 74"/>
+        <p:cNvGrpSpPr/>
+        <p:nvPr/>
+      </p:nvGrpSpPr>
+      <p:grpSpPr>
+        <a:xfrm>
+          <a:off x="0" y="0"/>
+          <a:ext cx="0" cy="0"/>
+          <a:chOff x="0" y="0"/>
+          <a:chExt cx="0" cy="0"/>
+        </a:xfrm>
+      </p:grpSpPr>
+      <p:sp>
+        <p:nvSpPr>
+          <p:cNvPr id="75" name="Google Shape;75;gac10fef634_0_20:notes"/>
+          <p:cNvSpPr>
+            <a:spLocks noGrp="1" noRot="1" noChangeAspect="1"/>
+          </p:cNvSpPr>
+          <p:nvPr>
+            <p:ph type="sldImg" idx="2"/>
+          </p:nvPr>
+        </p:nvSpPr>
+        <p:spPr>
+          <a:xfrm>
+            <a:off x="381000" y="685800"/>
+            <a:ext cx="6096000" cy="3429000"/>
+          </a:xfrm>
+          <a:custGeom>
+            <a:avLst/>
+            <a:gdLst/>
+            <a:ahLst/>
+            <a:cxnLst/>
+            <a:rect l="l" t="t" r="r" b="b"/>
+            <a:pathLst>
+              <a:path w="120000" h="120000" extrusionOk="0">
+                <a:moveTo>
+                  <a:pt x="0" y="0"/>
+                </a:moveTo>
+                <a:lnTo>
+                  <a:pt x="120000" y="0"/>
+                </a:lnTo>
+                <a:lnTo>
+                  <a:pt x="120000" y="120000"/>
+                </a:lnTo>
+                <a:lnTo>
+                  <a:pt x="0" y="120000"/>
+                </a:lnTo>
+                <a:close/>
+              </a:path>
+            </a:pathLst>
+          </a:custGeom>
+        </p:spPr>
+      </p:sp>
+      <p:sp>
+        <p:nvSpPr>
+          <p:cNvPr id="76" name="Google Shape;76;gac10fef634_0_20:notes"/>
+          <p:cNvSpPr txBox="1">
+            <a:spLocks noGrp="1"/>
+          </p:cNvSpPr>
+          <p:nvPr>
+            <p:ph type="body" idx="1"/>
+          </p:nvPr>
+        </p:nvSpPr>
+        <p:spPr>
+          <a:xfrm>
+            <a:off x="685800" y="4343400"/>
+            <a:ext cx="5486400" cy="4114800"/>
+          </a:xfrm>
+          <a:prstGeom prst="rect">
+            <a:avLst/>
+          </a:prstGeom>
+        </p:spPr>
+        <p:txBody>
+          <a:bodyPr spcFirstLastPara="1" wrap="square" lIns="91425" tIns="91425" rIns="91425" bIns="91425" anchor="t" anchorCtr="0">
+            <a:noAutofit/>
+          </a:bodyPr>
+          <a:lstStyle/>
+          <a:p>
+            <a:pPr marL="0" lvl="0" indent="0" algn="l" rtl="0">
+              <a:spcBef>
+                <a:spcPts val="0"/>
+              </a:spcBef>
+              <a:spcAft>
+                <a:spcPts val="0"/>
+              </a:spcAft>
+              <a:buNone/>
+            </a:pPr>
+            <a:endParaRPr/>
+          </a:p>
+        </p:txBody>
+      </p:sp>
+    </p:spTree>
+    <p:extLst>
+      <p:ext uri="{BB962C8B-B14F-4D97-AF65-F5344CB8AC3E}">
+        <p14:creationId xmlns:p14="http://schemas.microsoft.com/office/powerpoint/2010/main" val="870922320"/>
+      </p:ext>
+    </p:extLst>
+  </p:cSld>
+  <p:clrMapOvr>
+    <a:masterClrMapping/>
+  </p:clrMapOvr>
+</p:notes>
+</file>
+
+<file path=ppt/notesSlides/notesSlide11.xml><?xml version="1.0" encoding="utf-8"?>
+<p:notes xmlns:a="http://schemas.openxmlformats.org/drawingml/2006/main" xmlns:r="http://schemas.openxmlformats.org/officeDocument/2006/relationships" xmlns:p="http://schemas.openxmlformats.org/presentationml/2006/main" showMasterSp="0" showMasterPhAnim="0">
+  <p:cSld>
+    <p:spTree>
+      <p:nvGrpSpPr>
+        <p:cNvPr id="1" name="Shape 80"/>
+        <p:cNvGrpSpPr/>
+        <p:nvPr/>
+      </p:nvGrpSpPr>
+      <p:grpSpPr>
+        <a:xfrm>
+          <a:off x="0" y="0"/>
+          <a:ext cx="0" cy="0"/>
+          <a:chOff x="0" y="0"/>
+          <a:chExt cx="0" cy="0"/>
+        </a:xfrm>
+      </p:grpSpPr>
+      <p:sp>
+        <p:nvSpPr>
+          <p:cNvPr id="81" name="Google Shape;81;gac10fef634_0_25:notes"/>
+          <p:cNvSpPr>
+            <a:spLocks noGrp="1" noRot="1" noChangeAspect="1"/>
+          </p:cNvSpPr>
+          <p:nvPr>
+            <p:ph type="sldImg" idx="2"/>
+          </p:nvPr>
+        </p:nvSpPr>
+        <p:spPr>
+          <a:xfrm>
+            <a:off x="381000" y="685800"/>
+            <a:ext cx="6096000" cy="3429000"/>
+          </a:xfrm>
+          <a:custGeom>
+            <a:avLst/>
+            <a:gdLst/>
+            <a:ahLst/>
+            <a:cxnLst/>
+            <a:rect l="l" t="t" r="r" b="b"/>
+            <a:pathLst>
+              <a:path w="120000" h="120000" extrusionOk="0">
+                <a:moveTo>
+                  <a:pt x="0" y="0"/>
+                </a:moveTo>
+                <a:lnTo>
+                  <a:pt x="120000" y="0"/>
+                </a:lnTo>
+                <a:lnTo>
+                  <a:pt x="120000" y="120000"/>
+                </a:lnTo>
+                <a:lnTo>
+                  <a:pt x="0" y="120000"/>
+                </a:lnTo>
+                <a:close/>
+              </a:path>
+            </a:pathLst>
+          </a:custGeom>
+        </p:spPr>
+      </p:sp>
+      <p:sp>
+        <p:nvSpPr>
+          <p:cNvPr id="82" name="Google Shape;82;gac10fef634_0_25:notes"/>
+          <p:cNvSpPr txBox="1">
+            <a:spLocks noGrp="1"/>
+          </p:cNvSpPr>
+          <p:nvPr>
+            <p:ph type="body" idx="1"/>
+          </p:nvPr>
+        </p:nvSpPr>
+        <p:spPr>
+          <a:xfrm>
+            <a:off x="685800" y="4343400"/>
+            <a:ext cx="5486400" cy="4114800"/>
+          </a:xfrm>
+          <a:prstGeom prst="rect">
+            <a:avLst/>
+          </a:prstGeom>
+        </p:spPr>
+        <p:txBody>
+          <a:bodyPr spcFirstLastPara="1" wrap="square" lIns="91425" tIns="91425" rIns="91425" bIns="91425" anchor="t" anchorCtr="0">
+            <a:noAutofit/>
+          </a:bodyPr>
+          <a:lstStyle/>
+          <a:p>
+            <a:pPr marL="0" lvl="0" indent="0" algn="l" rtl="0">
+              <a:spcBef>
+                <a:spcPts val="0"/>
+              </a:spcBef>
+              <a:spcAft>
+                <a:spcPts val="0"/>
+              </a:spcAft>
+              <a:buClr>
+                <a:schemeClr val="dk1"/>
+              </a:buClr>
+              <a:buSzPts val="1100"/>
+              <a:buFont typeface="Arial"/>
+              <a:buNone/>
+            </a:pPr>
+            <a:r>
+              <a:rPr lang="en"/>
+              <a:t>Your version control evidence should go here.  This could be in the form of annotated screenshots which show you you managed this process or you could make a brief screencast explaining how you implemented version control.</a:t>
+            </a:r>
+            <a:endParaRPr/>
+          </a:p>
+          <a:p>
+            <a:pPr marL="0" lvl="0" indent="0" algn="l" rtl="0">
+              <a:spcBef>
+                <a:spcPts val="0"/>
+              </a:spcBef>
+              <a:spcAft>
+                <a:spcPts val="0"/>
+              </a:spcAft>
+              <a:buNone/>
+            </a:pPr>
+            <a:endParaRPr/>
+          </a:p>
+        </p:txBody>
+      </p:sp>
+    </p:spTree>
+  </p:cSld>
+  <p:clrMapOvr>
+    <a:masterClrMapping/>
+  </p:clrMapOvr>
+</p:notes>
+</file>
+
+<file path=ppt/notesSlides/notesSlide12.xml><?xml version="1.0" encoding="utf-8"?>
+<p:notes xmlns:a="http://schemas.openxmlformats.org/drawingml/2006/main" xmlns:r="http://schemas.openxmlformats.org/officeDocument/2006/relationships" xmlns:p="http://schemas.openxmlformats.org/presentationml/2006/main" showMasterSp="0" showMasterPhAnim="0">
+  <p:cSld>
+    <p:spTree>
+      <p:nvGrpSpPr>
+        <p:cNvPr id="1" name="Shape 86"/>
+        <p:cNvGrpSpPr/>
+        <p:nvPr/>
+      </p:nvGrpSpPr>
+      <p:grpSpPr>
+        <a:xfrm>
+          <a:off x="0" y="0"/>
+          <a:ext cx="0" cy="0"/>
+          <a:chOff x="0" y="0"/>
+          <a:chExt cx="0" cy="0"/>
+        </a:xfrm>
+      </p:grpSpPr>
+      <p:sp>
+        <p:nvSpPr>
+          <p:cNvPr id="87" name="Google Shape;87;gac10fef634_0_30:notes"/>
+          <p:cNvSpPr>
+            <a:spLocks noGrp="1" noRot="1" noChangeAspect="1"/>
+          </p:cNvSpPr>
+          <p:nvPr>
+            <p:ph type="sldImg" idx="2"/>
+          </p:nvPr>
+        </p:nvSpPr>
+        <p:spPr>
+          <a:xfrm>
+            <a:off x="381000" y="685800"/>
+            <a:ext cx="6096000" cy="3429000"/>
+          </a:xfrm>
+          <a:custGeom>
+            <a:avLst/>
+            <a:gdLst/>
+            <a:ahLst/>
+            <a:cxnLst/>
+            <a:rect l="l" t="t" r="r" b="b"/>
+            <a:pathLst>
+              <a:path w="120000" h="120000" extrusionOk="0">
+                <a:moveTo>
+                  <a:pt x="0" y="0"/>
+                </a:moveTo>
+                <a:lnTo>
+                  <a:pt x="120000" y="0"/>
+                </a:lnTo>
+                <a:lnTo>
+                  <a:pt x="120000" y="120000"/>
+                </a:lnTo>
+                <a:lnTo>
+                  <a:pt x="0" y="120000"/>
+                </a:lnTo>
+                <a:close/>
+              </a:path>
+            </a:pathLst>
+          </a:custGeom>
+        </p:spPr>
+      </p:sp>
+      <p:sp>
+        <p:nvSpPr>
+          <p:cNvPr id="88" name="Google Shape;88;gac10fef634_0_30:notes"/>
+          <p:cNvSpPr txBox="1">
+            <a:spLocks noGrp="1"/>
+          </p:cNvSpPr>
+          <p:nvPr>
+            <p:ph type="body" idx="1"/>
+          </p:nvPr>
+        </p:nvSpPr>
+        <p:spPr>
+          <a:xfrm>
+            <a:off x="685800" y="4343400"/>
+            <a:ext cx="5486400" cy="4114800"/>
+          </a:xfrm>
+          <a:prstGeom prst="rect">
+            <a:avLst/>
+          </a:prstGeom>
+        </p:spPr>
+        <p:txBody>
+          <a:bodyPr spcFirstLastPara="1" wrap="square" lIns="91425" tIns="91425" rIns="91425" bIns="91425" anchor="t" anchorCtr="0">
+            <a:noAutofit/>
+          </a:bodyPr>
+          <a:lstStyle/>
+          <a:p>
+            <a:pPr marL="0" lvl="0" indent="0" algn="l" rtl="0">
+              <a:spcBef>
+                <a:spcPts val="0"/>
+              </a:spcBef>
+              <a:spcAft>
+                <a:spcPts val="0"/>
+              </a:spcAft>
+              <a:buNone/>
+            </a:pPr>
+            <a:r>
+              <a:rPr lang="en"/>
+              <a:t>Discusses how the information from planning, testing and trialling of components assisted in the development of a high-quality outcome</a:t>
+            </a:r>
+            <a:endParaRPr/>
+          </a:p>
+        </p:txBody>
+      </p:sp>
+    </p:spTree>
+  </p:cSld>
+  <p:clrMapOvr>
+    <a:masterClrMapping/>
+  </p:clrMapOvr>
+</p:notes>
+</file>
+
 <file path=ppt/notesSlides/notesSlide2.xml><?xml version="1.0" encoding="utf-8"?>
 <p:notes xmlns:a="http://schemas.openxmlformats.org/drawingml/2006/main" xmlns:r="http://schemas.openxmlformats.org/officeDocument/2006/relationships" xmlns:p="http://schemas.openxmlformats.org/presentationml/2006/main" showMasterSp="0" showMasterPhAnim="0">
   <p:cSld>
@@ -1553,7 +2126,7 @@
   <p:cSld>
     <p:spTree>
       <p:nvGrpSpPr>
-        <p:cNvPr id="1" name="Shape 80"/>
+        <p:cNvPr id="1" name="Shape 69"/>
         <p:cNvGrpSpPr/>
         <p:nvPr/>
       </p:nvGrpSpPr>
@@ -1567,7 +2140,7 @@
       </p:grpSpPr>
       <p:sp>
         <p:nvSpPr>
-          <p:cNvPr id="81" name="Google Shape;81;gac10fef634_0_25:notes"/>
+          <p:cNvPr id="70" name="Google Shape;70;gac10fef634_0_16:notes"/>
           <p:cNvSpPr>
             <a:spLocks noGrp="1" noRot="1" noChangeAspect="1"/>
           </p:cNvSpPr>
@@ -1608,7 +2181,7 @@
       </p:sp>
       <p:sp>
         <p:nvSpPr>
-          <p:cNvPr id="82" name="Google Shape;82;gac10fef634_0_25:notes"/>
+          <p:cNvPr id="71" name="Google Shape;71;gac10fef634_0_16:notes"/>
           <p:cNvSpPr txBox="1">
             <a:spLocks noGrp="1"/>
           </p:cNvSpPr>
@@ -1638,27 +2211,6 @@
               <a:spcAft>
                 <a:spcPts val="0"/>
               </a:spcAft>
-              <a:buClr>
-                <a:schemeClr val="dk1"/>
-              </a:buClr>
-              <a:buSzPts val="1100"/>
-              <a:buFont typeface="Arial"/>
-              <a:buNone/>
-            </a:pPr>
-            <a:r>
-              <a:rPr lang="en"/>
-              <a:t>Your version control evidence should go here.  This could be in the form of annotated screenshots which show you you managed this process or you could make a brief screencast explaining how you implemented version control.</a:t>
-            </a:r>
-            <a:endParaRPr/>
-          </a:p>
-          <a:p>
-            <a:pPr marL="0" lvl="0" indent="0" algn="l" rtl="0">
-              <a:spcBef>
-                <a:spcPts val="0"/>
-              </a:spcBef>
-              <a:spcAft>
-                <a:spcPts val="0"/>
-              </a:spcAft>
               <a:buNone/>
             </a:pPr>
             <a:endParaRPr/>
@@ -1666,6 +2218,11 @@
         </p:txBody>
       </p:sp>
     </p:spTree>
+    <p:extLst>
+      <p:ext uri="{BB962C8B-B14F-4D97-AF65-F5344CB8AC3E}">
+        <p14:creationId xmlns:p14="http://schemas.microsoft.com/office/powerpoint/2010/main" val="4111395385"/>
+      </p:ext>
+    </p:extLst>
   </p:cSld>
   <p:clrMapOvr>
     <a:masterClrMapping/>
@@ -1678,7 +2235,7 @@
   <p:cSld>
     <p:spTree>
       <p:nvGrpSpPr>
-        <p:cNvPr id="1" name="Shape 86"/>
+        <p:cNvPr id="1" name="Shape 74"/>
         <p:cNvGrpSpPr/>
         <p:nvPr/>
       </p:nvGrpSpPr>
@@ -1692,7 +2249,7 @@
       </p:grpSpPr>
       <p:sp>
         <p:nvSpPr>
-          <p:cNvPr id="87" name="Google Shape;87;gac10fef634_0_30:notes"/>
+          <p:cNvPr id="75" name="Google Shape;75;gac10fef634_0_20:notes"/>
           <p:cNvSpPr>
             <a:spLocks noGrp="1" noRot="1" noChangeAspect="1"/>
           </p:cNvSpPr>
@@ -1733,7 +2290,7 @@
       </p:sp>
       <p:sp>
         <p:nvSpPr>
-          <p:cNvPr id="88" name="Google Shape;88;gac10fef634_0_30:notes"/>
+          <p:cNvPr id="76" name="Google Shape;76;gac10fef634_0_20:notes"/>
           <p:cNvSpPr txBox="1">
             <a:spLocks noGrp="1"/>
           </p:cNvSpPr>
@@ -1765,15 +2322,125 @@
               </a:spcAft>
               <a:buNone/>
             </a:pPr>
-            <a:r>
-              <a:rPr lang="en"/>
-              <a:t>Discusses how the information from planning, testing and trialling of components assisted in the development of a high-quality outcome</a:t>
-            </a:r>
             <a:endParaRPr/>
           </a:p>
         </p:txBody>
       </p:sp>
     </p:spTree>
+    <p:extLst>
+      <p:ext uri="{BB962C8B-B14F-4D97-AF65-F5344CB8AC3E}">
+        <p14:creationId xmlns:p14="http://schemas.microsoft.com/office/powerpoint/2010/main" val="303022213"/>
+      </p:ext>
+    </p:extLst>
+  </p:cSld>
+  <p:clrMapOvr>
+    <a:masterClrMapping/>
+  </p:clrMapOvr>
+</p:notes>
+</file>
+
+<file path=ppt/notesSlides/notesSlide9.xml><?xml version="1.0" encoding="utf-8"?>
+<p:notes xmlns:a="http://schemas.openxmlformats.org/drawingml/2006/main" xmlns:r="http://schemas.openxmlformats.org/officeDocument/2006/relationships" xmlns:p="http://schemas.openxmlformats.org/presentationml/2006/main" showMasterSp="0" showMasterPhAnim="0">
+  <p:cSld>
+    <p:spTree>
+      <p:nvGrpSpPr>
+        <p:cNvPr id="1" name="Shape 74"/>
+        <p:cNvGrpSpPr/>
+        <p:nvPr/>
+      </p:nvGrpSpPr>
+      <p:grpSpPr>
+        <a:xfrm>
+          <a:off x="0" y="0"/>
+          <a:ext cx="0" cy="0"/>
+          <a:chOff x="0" y="0"/>
+          <a:chExt cx="0" cy="0"/>
+        </a:xfrm>
+      </p:grpSpPr>
+      <p:sp>
+        <p:nvSpPr>
+          <p:cNvPr id="75" name="Google Shape;75;gac10fef634_0_20:notes"/>
+          <p:cNvSpPr>
+            <a:spLocks noGrp="1" noRot="1" noChangeAspect="1"/>
+          </p:cNvSpPr>
+          <p:nvPr>
+            <p:ph type="sldImg" idx="2"/>
+          </p:nvPr>
+        </p:nvSpPr>
+        <p:spPr>
+          <a:xfrm>
+            <a:off x="381000" y="685800"/>
+            <a:ext cx="6096000" cy="3429000"/>
+          </a:xfrm>
+          <a:custGeom>
+            <a:avLst/>
+            <a:gdLst/>
+            <a:ahLst/>
+            <a:cxnLst/>
+            <a:rect l="l" t="t" r="r" b="b"/>
+            <a:pathLst>
+              <a:path w="120000" h="120000" extrusionOk="0">
+                <a:moveTo>
+                  <a:pt x="0" y="0"/>
+                </a:moveTo>
+                <a:lnTo>
+                  <a:pt x="120000" y="0"/>
+                </a:lnTo>
+                <a:lnTo>
+                  <a:pt x="120000" y="120000"/>
+                </a:lnTo>
+                <a:lnTo>
+                  <a:pt x="0" y="120000"/>
+                </a:lnTo>
+                <a:close/>
+              </a:path>
+            </a:pathLst>
+          </a:custGeom>
+        </p:spPr>
+      </p:sp>
+      <p:sp>
+        <p:nvSpPr>
+          <p:cNvPr id="76" name="Google Shape;76;gac10fef634_0_20:notes"/>
+          <p:cNvSpPr txBox="1">
+            <a:spLocks noGrp="1"/>
+          </p:cNvSpPr>
+          <p:nvPr>
+            <p:ph type="body" idx="1"/>
+          </p:nvPr>
+        </p:nvSpPr>
+        <p:spPr>
+          <a:xfrm>
+            <a:off x="685800" y="4343400"/>
+            <a:ext cx="5486400" cy="4114800"/>
+          </a:xfrm>
+          <a:prstGeom prst="rect">
+            <a:avLst/>
+          </a:prstGeom>
+        </p:spPr>
+        <p:txBody>
+          <a:bodyPr spcFirstLastPara="1" wrap="square" lIns="91425" tIns="91425" rIns="91425" bIns="91425" anchor="t" anchorCtr="0">
+            <a:noAutofit/>
+          </a:bodyPr>
+          <a:lstStyle/>
+          <a:p>
+            <a:pPr marL="0" lvl="0" indent="0" algn="l" rtl="0">
+              <a:spcBef>
+                <a:spcPts val="0"/>
+              </a:spcBef>
+              <a:spcAft>
+                <a:spcPts val="0"/>
+              </a:spcAft>
+              <a:buNone/>
+            </a:pPr>
+            <a:endParaRPr/>
+          </a:p>
+        </p:txBody>
+      </p:sp>
+    </p:spTree>
+    <p:extLst>
+      <p:ext uri="{BB962C8B-B14F-4D97-AF65-F5344CB8AC3E}">
+        <p14:creationId xmlns:p14="http://schemas.microsoft.com/office/powerpoint/2010/main" val="1488301914"/>
+      </p:ext>
+    </p:extLst>
   </p:cSld>
   <p:clrMapOvr>
     <a:masterClrMapping/>
@@ -6826,6 +7493,455 @@
 </p:sld>
 </file>
 
+<file path=ppt/slides/slide10.xml><?xml version="1.0" encoding="utf-8"?>
+<p:sld xmlns:a="http://schemas.openxmlformats.org/drawingml/2006/main" xmlns:r="http://schemas.openxmlformats.org/officeDocument/2006/relationships" xmlns:p="http://schemas.openxmlformats.org/presentationml/2006/main">
+  <p:cSld>
+    <p:spTree>
+      <p:nvGrpSpPr>
+        <p:cNvPr id="1" name="Shape 77"/>
+        <p:cNvGrpSpPr/>
+        <p:nvPr/>
+      </p:nvGrpSpPr>
+      <p:grpSpPr>
+        <a:xfrm>
+          <a:off x="0" y="0"/>
+          <a:ext cx="0" cy="0"/>
+          <a:chOff x="0" y="0"/>
+          <a:chExt cx="0" cy="0"/>
+        </a:xfrm>
+      </p:grpSpPr>
+      <p:sp>
+        <p:nvSpPr>
+          <p:cNvPr id="78" name="Google Shape;78;p17"/>
+          <p:cNvSpPr txBox="1">
+            <a:spLocks noGrp="1"/>
+          </p:cNvSpPr>
+          <p:nvPr>
+            <p:ph type="title"/>
+          </p:nvPr>
+        </p:nvSpPr>
+        <p:spPr>
+          <a:xfrm>
+            <a:off x="311700" y="445025"/>
+            <a:ext cx="8520600" cy="572700"/>
+          </a:xfrm>
+          <a:prstGeom prst="rect">
+            <a:avLst/>
+          </a:prstGeom>
+        </p:spPr>
+        <p:txBody>
+          <a:bodyPr spcFirstLastPara="1" wrap="square" lIns="91425" tIns="91425" rIns="91425" bIns="91425" anchor="t" anchorCtr="0">
+            <a:noAutofit/>
+          </a:bodyPr>
+          <a:lstStyle/>
+          <a:p>
+            <a:pPr marL="0" lvl="0" indent="0" algn="l" rtl="0">
+              <a:spcBef>
+                <a:spcPts val="0"/>
+              </a:spcBef>
+              <a:spcAft>
+                <a:spcPts val="0"/>
+              </a:spcAft>
+              <a:buNone/>
+            </a:pPr>
+            <a:r>
+              <a:rPr lang="en" dirty="0"/>
+              <a:t>Component 2 version 3 - Test Plan (and screenshot)</a:t>
+            </a:r>
+            <a:endParaRPr dirty="0"/>
+          </a:p>
+        </p:txBody>
+      </p:sp>
+      <p:graphicFrame>
+        <p:nvGraphicFramePr>
+          <p:cNvPr id="79" name="Google Shape;79;p17"/>
+          <p:cNvGraphicFramePr/>
+          <p:nvPr/>
+        </p:nvGraphicFramePr>
+        <p:xfrm>
+          <a:off x="311700" y="3346462"/>
+          <a:ext cx="8520600" cy="1737300"/>
+        </p:xfrm>
+        <a:graphic>
+          <a:graphicData uri="http://schemas.openxmlformats.org/drawingml/2006/table">
+            <a:tbl>
+              <a:tblPr>
+                <a:noFill/>
+                <a:tableStyleId>{E1099E06-0E6B-448D-9D27-60429F06E6F4}</a:tableStyleId>
+              </a:tblPr>
+              <a:tblGrid>
+                <a:gridCol w="4260300">
+                  <a:extLst>
+                    <a:ext uri="{9D8B030D-6E8A-4147-A177-3AD203B41FA5}">
+                      <a16:colId xmlns:a16="http://schemas.microsoft.com/office/drawing/2014/main" val="20000"/>
+                    </a:ext>
+                  </a:extLst>
+                </a:gridCol>
+                <a:gridCol w="4260300">
+                  <a:extLst>
+                    <a:ext uri="{9D8B030D-6E8A-4147-A177-3AD203B41FA5}">
+                      <a16:colId xmlns:a16="http://schemas.microsoft.com/office/drawing/2014/main" val="20001"/>
+                    </a:ext>
+                  </a:extLst>
+                </a:gridCol>
+              </a:tblGrid>
+              <a:tr h="381000">
+                <a:tc>
+                  <a:txBody>
+                    <a:bodyPr/>
+                    <a:lstStyle/>
+                    <a:p>
+                      <a:pPr marL="0" lvl="0" indent="0" algn="l" rtl="0">
+                        <a:spcBef>
+                          <a:spcPts val="0"/>
+                        </a:spcBef>
+                        <a:spcAft>
+                          <a:spcPts val="0"/>
+                        </a:spcAft>
+                        <a:buNone/>
+                      </a:pPr>
+                      <a:r>
+                        <a:rPr lang="en" sz="1800" b="1"/>
+                        <a:t>Test Case</a:t>
+                      </a:r>
+                      <a:endParaRPr sz="1800" b="1"/>
+                    </a:p>
+                  </a:txBody>
+                  <a:tcPr marL="91425" marR="91425" marT="91425" marB="91425">
+                    <a:solidFill>
+                      <a:srgbClr val="CCCCCC"/>
+                    </a:solidFill>
+                  </a:tcPr>
+                </a:tc>
+                <a:tc>
+                  <a:txBody>
+                    <a:bodyPr/>
+                    <a:lstStyle/>
+                    <a:p>
+                      <a:pPr marL="0" lvl="0" indent="0" algn="l" rtl="0">
+                        <a:spcBef>
+                          <a:spcPts val="0"/>
+                        </a:spcBef>
+                        <a:spcAft>
+                          <a:spcPts val="0"/>
+                        </a:spcAft>
+                        <a:buNone/>
+                      </a:pPr>
+                      <a:r>
+                        <a:rPr lang="en" sz="1800" b="1"/>
+                        <a:t>Expected Values</a:t>
+                      </a:r>
+                      <a:endParaRPr sz="1800" b="1"/>
+                    </a:p>
+                  </a:txBody>
+                  <a:tcPr marL="91425" marR="91425" marT="91425" marB="91425">
+                    <a:solidFill>
+                      <a:srgbClr val="CCCCCC"/>
+                    </a:solidFill>
+                  </a:tcPr>
+                </a:tc>
+                <a:extLst>
+                  <a:ext uri="{0D108BD9-81ED-4DB2-BD59-A6C34878D82A}">
+                    <a16:rowId xmlns:a16="http://schemas.microsoft.com/office/drawing/2014/main" val="10000"/>
+                  </a:ext>
+                </a:extLst>
+              </a:tr>
+              <a:tr h="396200">
+                <a:tc>
+                  <a:txBody>
+                    <a:bodyPr/>
+                    <a:lstStyle/>
+                    <a:p>
+                      <a:pPr marL="0" lvl="0" indent="0" algn="l" rtl="0">
+                        <a:spcBef>
+                          <a:spcPts val="0"/>
+                        </a:spcBef>
+                        <a:spcAft>
+                          <a:spcPts val="0"/>
+                        </a:spcAft>
+                        <a:buNone/>
+                      </a:pPr>
+                      <a:r>
+                        <a:rPr lang="en-US" sz="1800" dirty="0"/>
+                        <a:t>Run Program</a:t>
+                      </a:r>
+                      <a:endParaRPr sz="1800" dirty="0"/>
+                    </a:p>
+                  </a:txBody>
+                  <a:tcPr marL="91425" marR="91425" marT="91425" marB="91425"/>
+                </a:tc>
+                <a:tc>
+                  <a:txBody>
+                    <a:bodyPr/>
+                    <a:lstStyle/>
+                    <a:p>
+                      <a:pPr marL="0" lvl="0" indent="0" algn="l" rtl="0">
+                        <a:spcBef>
+                          <a:spcPts val="0"/>
+                        </a:spcBef>
+                        <a:spcAft>
+                          <a:spcPts val="0"/>
+                        </a:spcAft>
+                        <a:buNone/>
+                      </a:pPr>
+                      <a:r>
+                        <a:rPr lang="en-US" sz="1800" dirty="0"/>
+                        <a:t>Enter p, program prints pickup</a:t>
+                      </a:r>
+                    </a:p>
+                    <a:p>
+                      <a:pPr marL="0" lvl="0" indent="0" algn="l" rtl="0">
+                        <a:spcBef>
+                          <a:spcPts val="0"/>
+                        </a:spcBef>
+                        <a:spcAft>
+                          <a:spcPts val="0"/>
+                        </a:spcAft>
+                        <a:buNone/>
+                      </a:pPr>
+                      <a:r>
+                        <a:rPr lang="en-US" sz="1800" dirty="0"/>
+                        <a:t>Enter d, program prints delivery</a:t>
+                      </a:r>
+                    </a:p>
+                    <a:p>
+                      <a:pPr marL="0" lvl="0" indent="0" algn="l" rtl="0">
+                        <a:spcBef>
+                          <a:spcPts val="0"/>
+                        </a:spcBef>
+                        <a:spcAft>
+                          <a:spcPts val="0"/>
+                        </a:spcAft>
+                        <a:buNone/>
+                      </a:pPr>
+                      <a:r>
+                        <a:rPr lang="en-US" sz="1800" dirty="0"/>
+                        <a:t>Enter invalid, program prints error message</a:t>
+                      </a:r>
+                      <a:endParaRPr sz="1800" dirty="0"/>
+                    </a:p>
+                  </a:txBody>
+                  <a:tcPr marL="91425" marR="91425" marT="91425" marB="91425"/>
+                </a:tc>
+                <a:extLst>
+                  <a:ext uri="{0D108BD9-81ED-4DB2-BD59-A6C34878D82A}">
+                    <a16:rowId xmlns:a16="http://schemas.microsoft.com/office/drawing/2014/main" val="10001"/>
+                  </a:ext>
+                </a:extLst>
+              </a:tr>
+            </a:tbl>
+          </a:graphicData>
+        </a:graphic>
+      </p:graphicFrame>
+    </p:spTree>
+    <p:extLst>
+      <p:ext uri="{BB962C8B-B14F-4D97-AF65-F5344CB8AC3E}">
+        <p14:creationId xmlns:p14="http://schemas.microsoft.com/office/powerpoint/2010/main" val="261580919"/>
+      </p:ext>
+    </p:extLst>
+  </p:cSld>
+  <p:clrMapOvr>
+    <a:masterClrMapping/>
+  </p:clrMapOvr>
+</p:sld>
+</file>
+
+<file path=ppt/slides/slide11.xml><?xml version="1.0" encoding="utf-8"?>
+<p:sld xmlns:a="http://schemas.openxmlformats.org/drawingml/2006/main" xmlns:r="http://schemas.openxmlformats.org/officeDocument/2006/relationships" xmlns:p="http://schemas.openxmlformats.org/presentationml/2006/main">
+  <p:cSld>
+    <p:bg>
+      <p:bgPr>
+        <a:solidFill>
+          <a:srgbClr val="D9EAD3"/>
+        </a:solidFill>
+        <a:effectLst/>
+      </p:bgPr>
+    </p:bg>
+    <p:spTree>
+      <p:nvGrpSpPr>
+        <p:cNvPr id="1" name="Shape 83"/>
+        <p:cNvGrpSpPr/>
+        <p:nvPr/>
+      </p:nvGrpSpPr>
+      <p:grpSpPr>
+        <a:xfrm>
+          <a:off x="0" y="0"/>
+          <a:ext cx="0" cy="0"/>
+          <a:chOff x="0" y="0"/>
+          <a:chExt cx="0" cy="0"/>
+        </a:xfrm>
+      </p:grpSpPr>
+      <p:sp>
+        <p:nvSpPr>
+          <p:cNvPr id="84" name="Google Shape;84;p18"/>
+          <p:cNvSpPr txBox="1">
+            <a:spLocks noGrp="1"/>
+          </p:cNvSpPr>
+          <p:nvPr>
+            <p:ph type="title"/>
+          </p:nvPr>
+        </p:nvSpPr>
+        <p:spPr>
+          <a:xfrm>
+            <a:off x="311700" y="445025"/>
+            <a:ext cx="8520600" cy="572700"/>
+          </a:xfrm>
+          <a:prstGeom prst="rect">
+            <a:avLst/>
+          </a:prstGeom>
+        </p:spPr>
+        <p:txBody>
+          <a:bodyPr spcFirstLastPara="1" wrap="square" lIns="91425" tIns="91425" rIns="91425" bIns="91425" anchor="t" anchorCtr="0">
+            <a:noAutofit/>
+          </a:bodyPr>
+          <a:lstStyle/>
+          <a:p>
+            <a:pPr marL="0" lvl="0" indent="0" algn="l" rtl="0">
+              <a:spcBef>
+                <a:spcPts val="0"/>
+              </a:spcBef>
+              <a:spcAft>
+                <a:spcPts val="0"/>
+              </a:spcAft>
+              <a:buNone/>
+            </a:pPr>
+            <a:r>
+              <a:rPr lang="en"/>
+              <a:t>Version Control Evidence</a:t>
+            </a:r>
+            <a:endParaRPr/>
+          </a:p>
+        </p:txBody>
+      </p:sp>
+      <p:sp>
+        <p:nvSpPr>
+          <p:cNvPr id="85" name="Google Shape;85;p18"/>
+          <p:cNvSpPr txBox="1">
+            <a:spLocks noGrp="1"/>
+          </p:cNvSpPr>
+          <p:nvPr>
+            <p:ph type="body" idx="1"/>
+          </p:nvPr>
+        </p:nvSpPr>
+        <p:spPr>
+          <a:xfrm>
+            <a:off x="311700" y="1152475"/>
+            <a:ext cx="8464200" cy="3739200"/>
+          </a:xfrm>
+          <a:prstGeom prst="rect">
+            <a:avLst/>
+          </a:prstGeom>
+        </p:spPr>
+        <p:txBody>
+          <a:bodyPr spcFirstLastPara="1" wrap="square" lIns="91425" tIns="91425" rIns="91425" bIns="91425" anchor="t" anchorCtr="0">
+            <a:noAutofit/>
+          </a:bodyPr>
+          <a:lstStyle/>
+          <a:p>
+            <a:pPr marL="0" lvl="0" indent="0" algn="l" rtl="0">
+              <a:spcBef>
+                <a:spcPts val="0"/>
+              </a:spcBef>
+              <a:spcAft>
+                <a:spcPts val="1600"/>
+              </a:spcAft>
+              <a:buNone/>
+            </a:pPr>
+            <a:r>
+              <a:rPr lang="en" i="1"/>
+              <a:t>Your version control evidence should go here.  This could be in the form of annotated screenshots which show you you managed this process or you could make a brief screencast explaining how you implemented version control.</a:t>
+            </a:r>
+            <a:endParaRPr i="1"/>
+          </a:p>
+        </p:txBody>
+      </p:sp>
+    </p:spTree>
+  </p:cSld>
+  <p:clrMapOvr>
+    <a:masterClrMapping/>
+  </p:clrMapOvr>
+</p:sld>
+</file>
+
+<file path=ppt/slides/slide12.xml><?xml version="1.0" encoding="utf-8"?>
+<p:sld xmlns:a="http://schemas.openxmlformats.org/drawingml/2006/main" xmlns:r="http://schemas.openxmlformats.org/officeDocument/2006/relationships" xmlns:p="http://schemas.openxmlformats.org/presentationml/2006/main">
+  <p:cSld>
+    <p:bg>
+      <p:bgPr>
+        <a:solidFill>
+          <a:srgbClr val="FFE599"/>
+        </a:solidFill>
+        <a:effectLst/>
+      </p:bgPr>
+    </p:bg>
+    <p:spTree>
+      <p:nvGrpSpPr>
+        <p:cNvPr id="1" name="Shape 89"/>
+        <p:cNvGrpSpPr/>
+        <p:nvPr/>
+      </p:nvGrpSpPr>
+      <p:grpSpPr>
+        <a:xfrm>
+          <a:off x="0" y="0"/>
+          <a:ext cx="0" cy="0"/>
+          <a:chOff x="0" y="0"/>
+          <a:chExt cx="0" cy="0"/>
+        </a:xfrm>
+      </p:grpSpPr>
+      <p:sp>
+        <p:nvSpPr>
+          <p:cNvPr id="90" name="Google Shape;90;p19"/>
+          <p:cNvSpPr txBox="1">
+            <a:spLocks noGrp="1"/>
+          </p:cNvSpPr>
+          <p:nvPr>
+            <p:ph type="body" idx="1"/>
+          </p:nvPr>
+        </p:nvSpPr>
+        <p:spPr>
+          <a:xfrm>
+            <a:off x="311700" y="397700"/>
+            <a:ext cx="8520600" cy="4171200"/>
+          </a:xfrm>
+          <a:prstGeom prst="rect">
+            <a:avLst/>
+          </a:prstGeom>
+        </p:spPr>
+        <p:txBody>
+          <a:bodyPr spcFirstLastPara="1" wrap="square" lIns="91425" tIns="91425" rIns="91425" bIns="91425" anchor="t" anchorCtr="0">
+            <a:noAutofit/>
+          </a:bodyPr>
+          <a:lstStyle/>
+          <a:p>
+            <a:pPr marL="0" lvl="0" indent="0" algn="l" rtl="0">
+              <a:spcBef>
+                <a:spcPts val="0"/>
+              </a:spcBef>
+              <a:spcAft>
+                <a:spcPts val="1600"/>
+              </a:spcAft>
+              <a:buNone/>
+            </a:pPr>
+            <a:r>
+              <a:rPr lang="en" b="1" i="1">
+                <a:solidFill>
+                  <a:srgbClr val="595959"/>
+                </a:solidFill>
+              </a:rPr>
+              <a:t>Discusses how the information from planning, testing and trialling of components assisted in the development of a high-quality outcome</a:t>
+            </a:r>
+            <a:endParaRPr/>
+          </a:p>
+        </p:txBody>
+      </p:sp>
+    </p:spTree>
+  </p:cSld>
+  <p:clrMapOvr>
+    <a:masterClrMapping/>
+  </p:clrMapOvr>
+</p:sld>
+</file>
+
 <file path=ppt/slides/slide2.xml><?xml version="1.0" encoding="utf-8"?>
 <p:sld xmlns:a="http://schemas.openxmlformats.org/drawingml/2006/main" xmlns:r="http://schemas.openxmlformats.org/officeDocument/2006/relationships" xmlns:p="http://schemas.openxmlformats.org/presentationml/2006/main">
   <p:cSld>
@@ -7851,7 +8967,7 @@
     </p:bg>
     <p:spTree>
       <p:nvGrpSpPr>
-        <p:cNvPr id="1" name="Shape 83"/>
+        <p:cNvPr id="1" name="Shape 72"/>
         <p:cNvGrpSpPr/>
         <p:nvPr/>
       </p:nvGrpSpPr>
@@ -7865,7 +8981,7 @@
       </p:grpSpPr>
       <p:sp>
         <p:nvSpPr>
-          <p:cNvPr id="84" name="Google Shape;84;p18"/>
+          <p:cNvPr id="73" name="Google Shape;73;p16"/>
           <p:cNvSpPr txBox="1">
             <a:spLocks noGrp="1"/>
           </p:cNvSpPr>
@@ -7898,56 +9014,49 @@
               <a:buNone/>
             </a:pPr>
             <a:r>
-              <a:rPr lang="en"/>
-              <a:t>Version Control Evidence</a:t>
+              <a:rPr lang="en" dirty="0"/>
+              <a:t>Component 2 (Trello screenshot)</a:t>
             </a:r>
-            <a:endParaRPr/>
+            <a:endParaRPr dirty="0"/>
           </a:p>
         </p:txBody>
       </p:sp>
-      <p:sp>
-        <p:nvSpPr>
-          <p:cNvPr id="85" name="Google Shape;85;p18"/>
-          <p:cNvSpPr txBox="1">
-            <a:spLocks noGrp="1"/>
-          </p:cNvSpPr>
-          <p:nvPr>
-            <p:ph type="body" idx="1"/>
-          </p:nvPr>
-        </p:nvSpPr>
+      <p:pic>
+        <p:nvPicPr>
+          <p:cNvPr id="3" name="Picture 2">
+            <a:extLst>
+              <a:ext uri="{FF2B5EF4-FFF2-40B4-BE49-F238E27FC236}">
+                <a16:creationId xmlns:a16="http://schemas.microsoft.com/office/drawing/2014/main" id="{197D0697-87BD-40C4-BD69-675F260A2009}"/>
+              </a:ext>
+            </a:extLst>
+          </p:cNvPr>
+          <p:cNvPicPr>
+            <a:picLocks noChangeAspect="1"/>
+          </p:cNvPicPr>
+          <p:nvPr/>
+        </p:nvPicPr>
+        <p:blipFill>
+          <a:blip r:embed="rId3"/>
+          <a:stretch>
+            <a:fillRect/>
+          </a:stretch>
+        </p:blipFill>
         <p:spPr>
           <a:xfrm>
-            <a:off x="311700" y="1152475"/>
-            <a:ext cx="8464200" cy="3739200"/>
+            <a:off x="170985" y="1761893"/>
+            <a:ext cx="4757854" cy="1944251"/>
           </a:xfrm>
           <a:prstGeom prst="rect">
             <a:avLst/>
           </a:prstGeom>
         </p:spPr>
-        <p:txBody>
-          <a:bodyPr spcFirstLastPara="1" wrap="square" lIns="91425" tIns="91425" rIns="91425" bIns="91425" anchor="t" anchorCtr="0">
-            <a:noAutofit/>
-          </a:bodyPr>
-          <a:lstStyle/>
-          <a:p>
-            <a:pPr marL="0" lvl="0" indent="0" algn="l" rtl="0">
-              <a:spcBef>
-                <a:spcPts val="0"/>
-              </a:spcBef>
-              <a:spcAft>
-                <a:spcPts val="1600"/>
-              </a:spcAft>
-              <a:buNone/>
-            </a:pPr>
-            <a:r>
-              <a:rPr lang="en" i="1"/>
-              <a:t>Your version control evidence should go here.  This could be in the form of annotated screenshots which show you you managed this process or you could make a brief screencast explaining how you implemented version control.</a:t>
-            </a:r>
-            <a:endParaRPr i="1"/>
-          </a:p>
-        </p:txBody>
-      </p:sp>
+      </p:pic>
     </p:spTree>
+    <p:extLst>
+      <p:ext uri="{BB962C8B-B14F-4D97-AF65-F5344CB8AC3E}">
+        <p14:creationId xmlns:p14="http://schemas.microsoft.com/office/powerpoint/2010/main" val="2184574201"/>
+      </p:ext>
+    </p:extLst>
   </p:cSld>
   <p:clrMapOvr>
     <a:masterClrMapping/>
@@ -7958,17 +9067,9 @@
 <file path=ppt/slides/slide8.xml><?xml version="1.0" encoding="utf-8"?>
 <p:sld xmlns:a="http://schemas.openxmlformats.org/drawingml/2006/main" xmlns:r="http://schemas.openxmlformats.org/officeDocument/2006/relationships" xmlns:p="http://schemas.openxmlformats.org/presentationml/2006/main">
   <p:cSld>
-    <p:bg>
-      <p:bgPr>
-        <a:solidFill>
-          <a:srgbClr val="FFE599"/>
-        </a:solidFill>
-        <a:effectLst/>
-      </p:bgPr>
-    </p:bg>
     <p:spTree>
       <p:nvGrpSpPr>
-        <p:cNvPr id="1" name="Shape 89"/>
+        <p:cNvPr id="1" name="Shape 77"/>
         <p:cNvGrpSpPr/>
         <p:nvPr/>
       </p:nvGrpSpPr>
@@ -7982,18 +9083,18 @@
       </p:grpSpPr>
       <p:sp>
         <p:nvSpPr>
-          <p:cNvPr id="90" name="Google Shape;90;p19"/>
+          <p:cNvPr id="78" name="Google Shape;78;p17"/>
           <p:cNvSpPr txBox="1">
             <a:spLocks noGrp="1"/>
           </p:cNvSpPr>
           <p:nvPr>
-            <p:ph type="body" idx="1"/>
+            <p:ph type="title"/>
           </p:nvPr>
         </p:nvSpPr>
         <p:spPr>
           <a:xfrm>
-            <a:off x="311700" y="397700"/>
-            <a:ext cx="8520600" cy="4171200"/>
+            <a:off x="311700" y="445025"/>
+            <a:ext cx="8520600" cy="572700"/>
           </a:xfrm>
           <a:prstGeom prst="rect">
             <a:avLst/>
@@ -8010,23 +9111,650 @@
                 <a:spcPts val="0"/>
               </a:spcBef>
               <a:spcAft>
-                <a:spcPts val="1600"/>
+                <a:spcPts val="0"/>
               </a:spcAft>
               <a:buNone/>
             </a:pPr>
             <a:r>
-              <a:rPr lang="en" b="1" i="1">
-                <a:solidFill>
-                  <a:srgbClr val="595959"/>
-                </a:solidFill>
-              </a:rPr>
-              <a:t>Discusses how the information from planning, testing and trialling of components assisted in the development of a high-quality outcome</a:t>
+              <a:rPr lang="en" dirty="0"/>
+              <a:t>Component 2 version 1 - Test Plan (and screenshot)</a:t>
             </a:r>
-            <a:endParaRPr/>
+            <a:endParaRPr dirty="0"/>
           </a:p>
         </p:txBody>
       </p:sp>
+      <p:graphicFrame>
+        <p:nvGraphicFramePr>
+          <p:cNvPr id="79" name="Google Shape;79;p17"/>
+          <p:cNvGraphicFramePr/>
+          <p:nvPr>
+            <p:extLst>
+              <p:ext uri="{D42A27DB-BD31-4B8C-83A1-F6EECF244321}">
+                <p14:modId xmlns:p14="http://schemas.microsoft.com/office/powerpoint/2010/main" val="1908051130"/>
+              </p:ext>
+            </p:extLst>
+          </p:nvPr>
+        </p:nvGraphicFramePr>
+        <p:xfrm>
+          <a:off x="311700" y="3428237"/>
+          <a:ext cx="8520600" cy="1462980"/>
+        </p:xfrm>
+        <a:graphic>
+          <a:graphicData uri="http://schemas.openxmlformats.org/drawingml/2006/table">
+            <a:tbl>
+              <a:tblPr>
+                <a:noFill/>
+                <a:tableStyleId>{E1099E06-0E6B-448D-9D27-60429F06E6F4}</a:tableStyleId>
+              </a:tblPr>
+              <a:tblGrid>
+                <a:gridCol w="4260300">
+                  <a:extLst>
+                    <a:ext uri="{9D8B030D-6E8A-4147-A177-3AD203B41FA5}">
+                      <a16:colId xmlns:a16="http://schemas.microsoft.com/office/drawing/2014/main" val="20000"/>
+                    </a:ext>
+                  </a:extLst>
+                </a:gridCol>
+                <a:gridCol w="4260300">
+                  <a:extLst>
+                    <a:ext uri="{9D8B030D-6E8A-4147-A177-3AD203B41FA5}">
+                      <a16:colId xmlns:a16="http://schemas.microsoft.com/office/drawing/2014/main" val="20001"/>
+                    </a:ext>
+                  </a:extLst>
+                </a:gridCol>
+              </a:tblGrid>
+              <a:tr h="381000">
+                <a:tc>
+                  <a:txBody>
+                    <a:bodyPr/>
+                    <a:lstStyle/>
+                    <a:p>
+                      <a:pPr marL="0" lvl="0" indent="0" algn="l" rtl="0">
+                        <a:spcBef>
+                          <a:spcPts val="0"/>
+                        </a:spcBef>
+                        <a:spcAft>
+                          <a:spcPts val="0"/>
+                        </a:spcAft>
+                        <a:buNone/>
+                      </a:pPr>
+                      <a:r>
+                        <a:rPr lang="en" sz="1800" b="1"/>
+                        <a:t>Test Case</a:t>
+                      </a:r>
+                      <a:endParaRPr sz="1800" b="1"/>
+                    </a:p>
+                  </a:txBody>
+                  <a:tcPr marL="91425" marR="91425" marT="91425" marB="91425">
+                    <a:solidFill>
+                      <a:srgbClr val="CCCCCC"/>
+                    </a:solidFill>
+                  </a:tcPr>
+                </a:tc>
+                <a:tc>
+                  <a:txBody>
+                    <a:bodyPr/>
+                    <a:lstStyle/>
+                    <a:p>
+                      <a:pPr marL="0" lvl="0" indent="0" algn="l" rtl="0">
+                        <a:spcBef>
+                          <a:spcPts val="0"/>
+                        </a:spcBef>
+                        <a:spcAft>
+                          <a:spcPts val="0"/>
+                        </a:spcAft>
+                        <a:buNone/>
+                      </a:pPr>
+                      <a:r>
+                        <a:rPr lang="en" sz="1800" b="1"/>
+                        <a:t>Expected Values</a:t>
+                      </a:r>
+                      <a:endParaRPr sz="1800" b="1"/>
+                    </a:p>
+                  </a:txBody>
+                  <a:tcPr marL="91425" marR="91425" marT="91425" marB="91425">
+                    <a:solidFill>
+                      <a:srgbClr val="CCCCCC"/>
+                    </a:solidFill>
+                  </a:tcPr>
+                </a:tc>
+                <a:extLst>
+                  <a:ext uri="{0D108BD9-81ED-4DB2-BD59-A6C34878D82A}">
+                    <a16:rowId xmlns:a16="http://schemas.microsoft.com/office/drawing/2014/main" val="10000"/>
+                  </a:ext>
+                </a:extLst>
+              </a:tr>
+              <a:tr h="396200">
+                <a:tc>
+                  <a:txBody>
+                    <a:bodyPr/>
+                    <a:lstStyle/>
+                    <a:p>
+                      <a:pPr marL="0" lvl="0" indent="0" algn="l" rtl="0">
+                        <a:spcBef>
+                          <a:spcPts val="0"/>
+                        </a:spcBef>
+                        <a:spcAft>
+                          <a:spcPts val="0"/>
+                        </a:spcAft>
+                        <a:buNone/>
+                      </a:pPr>
+                      <a:r>
+                        <a:rPr lang="en-US" sz="1800" dirty="0"/>
+                        <a:t>Run Program</a:t>
+                      </a:r>
+                      <a:endParaRPr sz="1800" dirty="0"/>
+                    </a:p>
+                  </a:txBody>
+                  <a:tcPr marL="91425" marR="91425" marT="91425" marB="91425"/>
+                </a:tc>
+                <a:tc>
+                  <a:txBody>
+                    <a:bodyPr/>
+                    <a:lstStyle/>
+                    <a:p>
+                      <a:pPr marL="0" lvl="0" indent="0" algn="l" rtl="0">
+                        <a:spcBef>
+                          <a:spcPts val="0"/>
+                        </a:spcBef>
+                        <a:spcAft>
+                          <a:spcPts val="0"/>
+                        </a:spcAft>
+                        <a:buNone/>
+                      </a:pPr>
+                      <a:r>
+                        <a:rPr lang="en-US" sz="1800" dirty="0"/>
+                        <a:t>Enter p, program prints pickup</a:t>
+                      </a:r>
+                    </a:p>
+                    <a:p>
+                      <a:pPr marL="0" lvl="0" indent="0" algn="l" rtl="0">
+                        <a:spcBef>
+                          <a:spcPts val="0"/>
+                        </a:spcBef>
+                        <a:spcAft>
+                          <a:spcPts val="0"/>
+                        </a:spcAft>
+                        <a:buNone/>
+                      </a:pPr>
+                      <a:r>
+                        <a:rPr lang="en-US" sz="1800" dirty="0"/>
+                        <a:t>Enter d, program prints delivery</a:t>
+                      </a:r>
+                    </a:p>
+                    <a:p>
+                      <a:pPr marL="0" lvl="0" indent="0" algn="l" rtl="0">
+                        <a:spcBef>
+                          <a:spcPts val="0"/>
+                        </a:spcBef>
+                        <a:spcAft>
+                          <a:spcPts val="0"/>
+                        </a:spcAft>
+                        <a:buNone/>
+                      </a:pPr>
+                      <a:r>
+                        <a:rPr lang="en-US" sz="1800" dirty="0"/>
+                        <a:t>Enter invalid program stops</a:t>
+                      </a:r>
+                      <a:endParaRPr sz="1800" dirty="0"/>
+                    </a:p>
+                  </a:txBody>
+                  <a:tcPr marL="91425" marR="91425" marT="91425" marB="91425"/>
+                </a:tc>
+                <a:extLst>
+                  <a:ext uri="{0D108BD9-81ED-4DB2-BD59-A6C34878D82A}">
+                    <a16:rowId xmlns:a16="http://schemas.microsoft.com/office/drawing/2014/main" val="10001"/>
+                  </a:ext>
+                </a:extLst>
+              </a:tr>
+            </a:tbl>
+          </a:graphicData>
+        </a:graphic>
+      </p:graphicFrame>
+      <p:pic>
+        <p:nvPicPr>
+          <p:cNvPr id="3" name="Picture 2">
+            <a:extLst>
+              <a:ext uri="{FF2B5EF4-FFF2-40B4-BE49-F238E27FC236}">
+                <a16:creationId xmlns:a16="http://schemas.microsoft.com/office/drawing/2014/main" id="{B8BF7FB4-B9AF-4E66-B789-79D79B11BBB0}"/>
+              </a:ext>
+            </a:extLst>
+          </p:cNvPr>
+          <p:cNvPicPr>
+            <a:picLocks noChangeAspect="1"/>
+          </p:cNvPicPr>
+          <p:nvPr/>
+        </p:nvPicPr>
+        <p:blipFill>
+          <a:blip r:embed="rId3"/>
+          <a:stretch>
+            <a:fillRect/>
+          </a:stretch>
+        </p:blipFill>
+        <p:spPr>
+          <a:xfrm>
+            <a:off x="311700" y="1144859"/>
+            <a:ext cx="4047272" cy="2054333"/>
+          </a:xfrm>
+          <a:prstGeom prst="rect">
+            <a:avLst/>
+          </a:prstGeom>
+        </p:spPr>
+      </p:pic>
+      <p:pic>
+        <p:nvPicPr>
+          <p:cNvPr id="5" name="Picture 4">
+            <a:extLst>
+              <a:ext uri="{FF2B5EF4-FFF2-40B4-BE49-F238E27FC236}">
+                <a16:creationId xmlns:a16="http://schemas.microsoft.com/office/drawing/2014/main" id="{608389D4-B7E5-4903-A648-96A3DC606C0C}"/>
+              </a:ext>
+            </a:extLst>
+          </p:cNvPr>
+          <p:cNvPicPr>
+            <a:picLocks noChangeAspect="1"/>
+          </p:cNvPicPr>
+          <p:nvPr/>
+        </p:nvPicPr>
+        <p:blipFill>
+          <a:blip r:embed="rId4"/>
+          <a:stretch>
+            <a:fillRect/>
+          </a:stretch>
+        </p:blipFill>
+        <p:spPr>
+          <a:xfrm>
+            <a:off x="4572000" y="1001635"/>
+            <a:ext cx="3528657" cy="1100075"/>
+          </a:xfrm>
+          <a:prstGeom prst="rect">
+            <a:avLst/>
+          </a:prstGeom>
+        </p:spPr>
+      </p:pic>
+      <p:pic>
+        <p:nvPicPr>
+          <p:cNvPr id="7" name="Picture 6">
+            <a:extLst>
+              <a:ext uri="{FF2B5EF4-FFF2-40B4-BE49-F238E27FC236}">
+                <a16:creationId xmlns:a16="http://schemas.microsoft.com/office/drawing/2014/main" id="{777C52D0-8C4F-45F1-A447-F1FF11B77E89}"/>
+              </a:ext>
+            </a:extLst>
+          </p:cNvPr>
+          <p:cNvPicPr>
+            <a:picLocks noChangeAspect="1"/>
+          </p:cNvPicPr>
+          <p:nvPr/>
+        </p:nvPicPr>
+        <p:blipFill>
+          <a:blip r:embed="rId5"/>
+          <a:stretch>
+            <a:fillRect/>
+          </a:stretch>
+        </p:blipFill>
+        <p:spPr>
+          <a:xfrm>
+            <a:off x="4572000" y="2192606"/>
+            <a:ext cx="3633168" cy="1053839"/>
+          </a:xfrm>
+          <a:prstGeom prst="rect">
+            <a:avLst/>
+          </a:prstGeom>
+        </p:spPr>
+      </p:pic>
     </p:spTree>
+    <p:extLst>
+      <p:ext uri="{BB962C8B-B14F-4D97-AF65-F5344CB8AC3E}">
+        <p14:creationId xmlns:p14="http://schemas.microsoft.com/office/powerpoint/2010/main" val="1708805901"/>
+      </p:ext>
+    </p:extLst>
+  </p:cSld>
+  <p:clrMapOvr>
+    <a:masterClrMapping/>
+  </p:clrMapOvr>
+</p:sld>
+</file>
+
+<file path=ppt/slides/slide9.xml><?xml version="1.0" encoding="utf-8"?>
+<p:sld xmlns:a="http://schemas.openxmlformats.org/drawingml/2006/main" xmlns:r="http://schemas.openxmlformats.org/officeDocument/2006/relationships" xmlns:p="http://schemas.openxmlformats.org/presentationml/2006/main">
+  <p:cSld>
+    <p:spTree>
+      <p:nvGrpSpPr>
+        <p:cNvPr id="1" name="Shape 77"/>
+        <p:cNvGrpSpPr/>
+        <p:nvPr/>
+      </p:nvGrpSpPr>
+      <p:grpSpPr>
+        <a:xfrm>
+          <a:off x="0" y="0"/>
+          <a:ext cx="0" cy="0"/>
+          <a:chOff x="0" y="0"/>
+          <a:chExt cx="0" cy="0"/>
+        </a:xfrm>
+      </p:grpSpPr>
+      <p:sp>
+        <p:nvSpPr>
+          <p:cNvPr id="78" name="Google Shape;78;p17"/>
+          <p:cNvSpPr txBox="1">
+            <a:spLocks noGrp="1"/>
+          </p:cNvSpPr>
+          <p:nvPr>
+            <p:ph type="title"/>
+          </p:nvPr>
+        </p:nvSpPr>
+        <p:spPr>
+          <a:xfrm>
+            <a:off x="311700" y="445025"/>
+            <a:ext cx="8520600" cy="572700"/>
+          </a:xfrm>
+          <a:prstGeom prst="rect">
+            <a:avLst/>
+          </a:prstGeom>
+        </p:spPr>
+        <p:txBody>
+          <a:bodyPr spcFirstLastPara="1" wrap="square" lIns="91425" tIns="91425" rIns="91425" bIns="91425" anchor="t" anchorCtr="0">
+            <a:noAutofit/>
+          </a:bodyPr>
+          <a:lstStyle/>
+          <a:p>
+            <a:pPr marL="0" lvl="0" indent="0" algn="l" rtl="0">
+              <a:spcBef>
+                <a:spcPts val="0"/>
+              </a:spcBef>
+              <a:spcAft>
+                <a:spcPts val="0"/>
+              </a:spcAft>
+              <a:buNone/>
+            </a:pPr>
+            <a:r>
+              <a:rPr lang="en" dirty="0"/>
+              <a:t>Component 2 version 2 - Test Plan (and screenshot)</a:t>
+            </a:r>
+            <a:endParaRPr dirty="0"/>
+          </a:p>
+        </p:txBody>
+      </p:sp>
+      <p:graphicFrame>
+        <p:nvGraphicFramePr>
+          <p:cNvPr id="79" name="Google Shape;79;p17"/>
+          <p:cNvGraphicFramePr/>
+          <p:nvPr>
+            <p:extLst>
+              <p:ext uri="{D42A27DB-BD31-4B8C-83A1-F6EECF244321}">
+                <p14:modId xmlns:p14="http://schemas.microsoft.com/office/powerpoint/2010/main" val="1628846609"/>
+              </p:ext>
+            </p:extLst>
+          </p:nvPr>
+        </p:nvGraphicFramePr>
+        <p:xfrm>
+          <a:off x="311700" y="3346462"/>
+          <a:ext cx="8520600" cy="1737300"/>
+        </p:xfrm>
+        <a:graphic>
+          <a:graphicData uri="http://schemas.openxmlformats.org/drawingml/2006/table">
+            <a:tbl>
+              <a:tblPr>
+                <a:noFill/>
+                <a:tableStyleId>{E1099E06-0E6B-448D-9D27-60429F06E6F4}</a:tableStyleId>
+              </a:tblPr>
+              <a:tblGrid>
+                <a:gridCol w="4260300">
+                  <a:extLst>
+                    <a:ext uri="{9D8B030D-6E8A-4147-A177-3AD203B41FA5}">
+                      <a16:colId xmlns:a16="http://schemas.microsoft.com/office/drawing/2014/main" val="20000"/>
+                    </a:ext>
+                  </a:extLst>
+                </a:gridCol>
+                <a:gridCol w="4260300">
+                  <a:extLst>
+                    <a:ext uri="{9D8B030D-6E8A-4147-A177-3AD203B41FA5}">
+                      <a16:colId xmlns:a16="http://schemas.microsoft.com/office/drawing/2014/main" val="20001"/>
+                    </a:ext>
+                  </a:extLst>
+                </a:gridCol>
+              </a:tblGrid>
+              <a:tr h="381000">
+                <a:tc>
+                  <a:txBody>
+                    <a:bodyPr/>
+                    <a:lstStyle/>
+                    <a:p>
+                      <a:pPr marL="0" lvl="0" indent="0" algn="l" rtl="0">
+                        <a:spcBef>
+                          <a:spcPts val="0"/>
+                        </a:spcBef>
+                        <a:spcAft>
+                          <a:spcPts val="0"/>
+                        </a:spcAft>
+                        <a:buNone/>
+                      </a:pPr>
+                      <a:r>
+                        <a:rPr lang="en" sz="1800" b="1"/>
+                        <a:t>Test Case</a:t>
+                      </a:r>
+                      <a:endParaRPr sz="1800" b="1"/>
+                    </a:p>
+                  </a:txBody>
+                  <a:tcPr marL="91425" marR="91425" marT="91425" marB="91425">
+                    <a:solidFill>
+                      <a:srgbClr val="CCCCCC"/>
+                    </a:solidFill>
+                  </a:tcPr>
+                </a:tc>
+                <a:tc>
+                  <a:txBody>
+                    <a:bodyPr/>
+                    <a:lstStyle/>
+                    <a:p>
+                      <a:pPr marL="0" lvl="0" indent="0" algn="l" rtl="0">
+                        <a:spcBef>
+                          <a:spcPts val="0"/>
+                        </a:spcBef>
+                        <a:spcAft>
+                          <a:spcPts val="0"/>
+                        </a:spcAft>
+                        <a:buNone/>
+                      </a:pPr>
+                      <a:r>
+                        <a:rPr lang="en" sz="1800" b="1"/>
+                        <a:t>Expected Values</a:t>
+                      </a:r>
+                      <a:endParaRPr sz="1800" b="1"/>
+                    </a:p>
+                  </a:txBody>
+                  <a:tcPr marL="91425" marR="91425" marT="91425" marB="91425">
+                    <a:solidFill>
+                      <a:srgbClr val="CCCCCC"/>
+                    </a:solidFill>
+                  </a:tcPr>
+                </a:tc>
+                <a:extLst>
+                  <a:ext uri="{0D108BD9-81ED-4DB2-BD59-A6C34878D82A}">
+                    <a16:rowId xmlns:a16="http://schemas.microsoft.com/office/drawing/2014/main" val="10000"/>
+                  </a:ext>
+                </a:extLst>
+              </a:tr>
+              <a:tr h="396200">
+                <a:tc>
+                  <a:txBody>
+                    <a:bodyPr/>
+                    <a:lstStyle/>
+                    <a:p>
+                      <a:pPr marL="0" lvl="0" indent="0" algn="l" rtl="0">
+                        <a:spcBef>
+                          <a:spcPts val="0"/>
+                        </a:spcBef>
+                        <a:spcAft>
+                          <a:spcPts val="0"/>
+                        </a:spcAft>
+                        <a:buNone/>
+                      </a:pPr>
+                      <a:r>
+                        <a:rPr lang="en-US" sz="1800" dirty="0"/>
+                        <a:t>Run Program</a:t>
+                      </a:r>
+                      <a:endParaRPr sz="1800" dirty="0"/>
+                    </a:p>
+                  </a:txBody>
+                  <a:tcPr marL="91425" marR="91425" marT="91425" marB="91425"/>
+                </a:tc>
+                <a:tc>
+                  <a:txBody>
+                    <a:bodyPr/>
+                    <a:lstStyle/>
+                    <a:p>
+                      <a:pPr marL="0" lvl="0" indent="0" algn="l" rtl="0">
+                        <a:spcBef>
+                          <a:spcPts val="0"/>
+                        </a:spcBef>
+                        <a:spcAft>
+                          <a:spcPts val="0"/>
+                        </a:spcAft>
+                        <a:buNone/>
+                      </a:pPr>
+                      <a:r>
+                        <a:rPr lang="en-US" sz="1800" dirty="0"/>
+                        <a:t>Enter p, program prints pickup</a:t>
+                      </a:r>
+                    </a:p>
+                    <a:p>
+                      <a:pPr marL="0" lvl="0" indent="0" algn="l" rtl="0">
+                        <a:spcBef>
+                          <a:spcPts val="0"/>
+                        </a:spcBef>
+                        <a:spcAft>
+                          <a:spcPts val="0"/>
+                        </a:spcAft>
+                        <a:buNone/>
+                      </a:pPr>
+                      <a:r>
+                        <a:rPr lang="en-US" sz="1800" dirty="0"/>
+                        <a:t>Enter d, program prints delivery</a:t>
+                      </a:r>
+                    </a:p>
+                    <a:p>
+                      <a:pPr marL="0" lvl="0" indent="0" algn="l" rtl="0">
+                        <a:spcBef>
+                          <a:spcPts val="0"/>
+                        </a:spcBef>
+                        <a:spcAft>
+                          <a:spcPts val="0"/>
+                        </a:spcAft>
+                        <a:buNone/>
+                      </a:pPr>
+                      <a:r>
+                        <a:rPr lang="en-US" sz="1800" dirty="0"/>
+                        <a:t>Enter invalid, program prints error message</a:t>
+                      </a:r>
+                      <a:endParaRPr sz="1800" dirty="0"/>
+                    </a:p>
+                  </a:txBody>
+                  <a:tcPr marL="91425" marR="91425" marT="91425" marB="91425"/>
+                </a:tc>
+                <a:extLst>
+                  <a:ext uri="{0D108BD9-81ED-4DB2-BD59-A6C34878D82A}">
+                    <a16:rowId xmlns:a16="http://schemas.microsoft.com/office/drawing/2014/main" val="10001"/>
+                  </a:ext>
+                </a:extLst>
+              </a:tr>
+            </a:tbl>
+          </a:graphicData>
+        </a:graphic>
+      </p:graphicFrame>
+      <p:pic>
+        <p:nvPicPr>
+          <p:cNvPr id="4" name="Picture 3">
+            <a:extLst>
+              <a:ext uri="{FF2B5EF4-FFF2-40B4-BE49-F238E27FC236}">
+                <a16:creationId xmlns:a16="http://schemas.microsoft.com/office/drawing/2014/main" id="{3832E362-3159-442B-A847-06D8EF6B7A6A}"/>
+              </a:ext>
+            </a:extLst>
+          </p:cNvPr>
+          <p:cNvPicPr>
+            <a:picLocks noChangeAspect="1"/>
+          </p:cNvPicPr>
+          <p:nvPr/>
+        </p:nvPicPr>
+        <p:blipFill>
+          <a:blip r:embed="rId3"/>
+          <a:stretch>
+            <a:fillRect/>
+          </a:stretch>
+        </p:blipFill>
+        <p:spPr>
+          <a:xfrm>
+            <a:off x="311699" y="1010561"/>
+            <a:ext cx="4104183" cy="2276039"/>
+          </a:xfrm>
+          <a:prstGeom prst="rect">
+            <a:avLst/>
+          </a:prstGeom>
+        </p:spPr>
+      </p:pic>
+      <p:pic>
+        <p:nvPicPr>
+          <p:cNvPr id="8" name="Picture 7">
+            <a:extLst>
+              <a:ext uri="{FF2B5EF4-FFF2-40B4-BE49-F238E27FC236}">
+                <a16:creationId xmlns:a16="http://schemas.microsoft.com/office/drawing/2014/main" id="{057C1079-588F-4790-9229-59FB718FC3F7}"/>
+              </a:ext>
+            </a:extLst>
+          </p:cNvPr>
+          <p:cNvPicPr>
+            <a:picLocks noChangeAspect="1"/>
+          </p:cNvPicPr>
+          <p:nvPr/>
+        </p:nvPicPr>
+        <p:blipFill>
+          <a:blip r:embed="rId4"/>
+          <a:stretch>
+            <a:fillRect/>
+          </a:stretch>
+        </p:blipFill>
+        <p:spPr>
+          <a:xfrm>
+            <a:off x="4950153" y="995637"/>
+            <a:ext cx="3882147" cy="1189575"/>
+          </a:xfrm>
+          <a:prstGeom prst="rect">
+            <a:avLst/>
+          </a:prstGeom>
+        </p:spPr>
+      </p:pic>
+      <p:pic>
+        <p:nvPicPr>
+          <p:cNvPr id="10" name="Picture 9">
+            <a:extLst>
+              <a:ext uri="{FF2B5EF4-FFF2-40B4-BE49-F238E27FC236}">
+                <a16:creationId xmlns:a16="http://schemas.microsoft.com/office/drawing/2014/main" id="{9940AE9B-D2AE-411F-8657-86D21E039646}"/>
+              </a:ext>
+            </a:extLst>
+          </p:cNvPr>
+          <p:cNvPicPr>
+            <a:picLocks noChangeAspect="1"/>
+          </p:cNvPicPr>
+          <p:nvPr/>
+        </p:nvPicPr>
+        <p:blipFill>
+          <a:blip r:embed="rId5"/>
+          <a:stretch>
+            <a:fillRect/>
+          </a:stretch>
+        </p:blipFill>
+        <p:spPr>
+          <a:xfrm>
+            <a:off x="4950153" y="2201020"/>
+            <a:ext cx="3674307" cy="1092550"/>
+          </a:xfrm>
+          <a:prstGeom prst="rect">
+            <a:avLst/>
+          </a:prstGeom>
+        </p:spPr>
+      </p:pic>
+    </p:spTree>
+    <p:extLst>
+      <p:ext uri="{BB962C8B-B14F-4D97-AF65-F5344CB8AC3E}">
+        <p14:creationId xmlns:p14="http://schemas.microsoft.com/office/powerpoint/2010/main" val="545315332"/>
+      </p:ext>
+    </p:extLst>
   </p:cSld>
   <p:clrMapOvr>
     <a:masterClrMapping/>

</xml_diff>